<commit_message>
Updates to mini lesson ppt
</commit_message>
<xml_diff>
--- a/MiniLesson.pptx
+++ b/MiniLesson.pptx
@@ -8,13 +8,16 @@
     <p:sldId id="256" r:id="rId2"/>
     <p:sldId id="257" r:id="rId3"/>
     <p:sldId id="258" r:id="rId4"/>
-    <p:sldId id="259" r:id="rId5"/>
-    <p:sldId id="260" r:id="rId6"/>
-    <p:sldId id="261" r:id="rId7"/>
-    <p:sldId id="262" r:id="rId8"/>
-    <p:sldId id="263" r:id="rId9"/>
-    <p:sldId id="264" r:id="rId10"/>
-    <p:sldId id="265" r:id="rId11"/>
+    <p:sldId id="266" r:id="rId5"/>
+    <p:sldId id="261" r:id="rId6"/>
+    <p:sldId id="262" r:id="rId7"/>
+    <p:sldId id="263" r:id="rId8"/>
+    <p:sldId id="264" r:id="rId9"/>
+    <p:sldId id="267" r:id="rId10"/>
+    <p:sldId id="268" r:id="rId11"/>
+    <p:sldId id="269" r:id="rId12"/>
+    <p:sldId id="270" r:id="rId13"/>
+    <p:sldId id="265" r:id="rId14"/>
   </p:sldIdLst>
   <p:sldSz cx="12192000" cy="6858000"/>
   <p:notesSz cx="6858000" cy="9144000"/>
@@ -3393,6 +3396,390 @@
           <p:cNvPr id="2" name="Title 1">
             <a:extLst>
               <a:ext uri="{FF2B5EF4-FFF2-40B4-BE49-F238E27FC236}">
+                <a16:creationId xmlns:a16="http://schemas.microsoft.com/office/drawing/2014/main" id="{329B1775-59BB-D728-2E3D-974E7AB44CE9}"/>
+              </a:ext>
+            </a:extLst>
+          </p:cNvPr>
+          <p:cNvSpPr>
+            <a:spLocks noGrp="1"/>
+          </p:cNvSpPr>
+          <p:nvPr>
+            <p:ph type="title"/>
+          </p:nvPr>
+        </p:nvSpPr>
+        <p:spPr/>
+        <p:txBody>
+          <a:bodyPr/>
+          <a:lstStyle/>
+          <a:p>
+            <a:r>
+              <a:rPr lang="en-US" dirty="0"/>
+              <a:t>Solving Binomials</a:t>
+            </a:r>
+          </a:p>
+        </p:txBody>
+      </p:sp>
+      <p:sp>
+        <p:nvSpPr>
+          <p:cNvPr id="3" name="Content Placeholder 2">
+            <a:extLst>
+              <a:ext uri="{FF2B5EF4-FFF2-40B4-BE49-F238E27FC236}">
+                <a16:creationId xmlns:a16="http://schemas.microsoft.com/office/drawing/2014/main" id="{68BA2231-1A96-859C-8EDA-8F269522B2D7}"/>
+              </a:ext>
+            </a:extLst>
+          </p:cNvPr>
+          <p:cNvSpPr>
+            <a:spLocks noGrp="1"/>
+          </p:cNvSpPr>
+          <p:nvPr>
+            <p:ph idx="1"/>
+          </p:nvPr>
+        </p:nvSpPr>
+        <p:spPr/>
+        <p:txBody>
+          <a:bodyPr/>
+          <a:lstStyle/>
+          <a:p>
+            <a:r>
+              <a:rPr lang="en-US" dirty="0">
+                <a:latin typeface="Ink Free" panose="03080402000500000000" pitchFamily="66" charset="0"/>
+              </a:rPr>
+              <a:t>2x</a:t>
+            </a:r>
+            <a:r>
+              <a:rPr lang="en-US" baseline="30000" dirty="0">
+                <a:latin typeface="Ink Free" panose="03080402000500000000" pitchFamily="66" charset="0"/>
+              </a:rPr>
+              <a:t>2</a:t>
+            </a:r>
+            <a:r>
+              <a:rPr lang="en-US" dirty="0">
+                <a:latin typeface="Ink Free" panose="03080402000500000000" pitchFamily="66" charset="0"/>
+              </a:rPr>
+              <a:t>+12x		= 0</a:t>
+            </a:r>
+          </a:p>
+          <a:p>
+            <a:r>
+              <a:rPr lang="en-US" dirty="0">
+                <a:solidFill>
+                  <a:srgbClr val="FF0000"/>
+                </a:solidFill>
+                <a:latin typeface="Ink Free" panose="03080402000500000000" pitchFamily="66" charset="0"/>
+              </a:rPr>
+              <a:t>2x</a:t>
+            </a:r>
+            <a:r>
+              <a:rPr lang="en-US" dirty="0">
+                <a:latin typeface="Ink Free" panose="03080402000500000000" pitchFamily="66" charset="0"/>
+              </a:rPr>
+              <a:t>(x+6)		= 0</a:t>
+            </a:r>
+          </a:p>
+        </p:txBody>
+      </p:sp>
+    </p:spTree>
+    <p:extLst>
+      <p:ext uri="{BB962C8B-B14F-4D97-AF65-F5344CB8AC3E}">
+        <p14:creationId xmlns:p14="http://schemas.microsoft.com/office/powerpoint/2010/main" val="903969965"/>
+      </p:ext>
+    </p:extLst>
+  </p:cSld>
+  <p:clrMapOvr>
+    <a:masterClrMapping/>
+  </p:clrMapOvr>
+</p:sld>
+</file>
+
+<file path=ppt/slides/slide11.xml><?xml version="1.0" encoding="utf-8"?>
+<p:sld xmlns:a="http://schemas.openxmlformats.org/drawingml/2006/main" xmlns:r="http://schemas.openxmlformats.org/officeDocument/2006/relationships" xmlns:p="http://schemas.openxmlformats.org/presentationml/2006/main">
+  <p:cSld>
+    <p:spTree>
+      <p:nvGrpSpPr>
+        <p:cNvPr id="1" name=""/>
+        <p:cNvGrpSpPr/>
+        <p:nvPr/>
+      </p:nvGrpSpPr>
+      <p:grpSpPr>
+        <a:xfrm>
+          <a:off x="0" y="0"/>
+          <a:ext cx="0" cy="0"/>
+          <a:chOff x="0" y="0"/>
+          <a:chExt cx="0" cy="0"/>
+        </a:xfrm>
+      </p:grpSpPr>
+      <p:sp>
+        <p:nvSpPr>
+          <p:cNvPr id="2" name="Title 1">
+            <a:extLst>
+              <a:ext uri="{FF2B5EF4-FFF2-40B4-BE49-F238E27FC236}">
+                <a16:creationId xmlns:a16="http://schemas.microsoft.com/office/drawing/2014/main" id="{329B1775-59BB-D728-2E3D-974E7AB44CE9}"/>
+              </a:ext>
+            </a:extLst>
+          </p:cNvPr>
+          <p:cNvSpPr>
+            <a:spLocks noGrp="1"/>
+          </p:cNvSpPr>
+          <p:nvPr>
+            <p:ph type="title"/>
+          </p:nvPr>
+        </p:nvSpPr>
+        <p:spPr/>
+        <p:txBody>
+          <a:bodyPr/>
+          <a:lstStyle/>
+          <a:p>
+            <a:r>
+              <a:rPr lang="en-US" dirty="0"/>
+              <a:t>Solving Binomials</a:t>
+            </a:r>
+          </a:p>
+        </p:txBody>
+      </p:sp>
+      <p:sp>
+        <p:nvSpPr>
+          <p:cNvPr id="3" name="Content Placeholder 2">
+            <a:extLst>
+              <a:ext uri="{FF2B5EF4-FFF2-40B4-BE49-F238E27FC236}">
+                <a16:creationId xmlns:a16="http://schemas.microsoft.com/office/drawing/2014/main" id="{68BA2231-1A96-859C-8EDA-8F269522B2D7}"/>
+              </a:ext>
+            </a:extLst>
+          </p:cNvPr>
+          <p:cNvSpPr>
+            <a:spLocks noGrp="1"/>
+          </p:cNvSpPr>
+          <p:nvPr>
+            <p:ph idx="1"/>
+          </p:nvPr>
+        </p:nvSpPr>
+        <p:spPr/>
+        <p:txBody>
+          <a:bodyPr/>
+          <a:lstStyle/>
+          <a:p>
+            <a:r>
+              <a:rPr lang="en-US" dirty="0">
+                <a:latin typeface="Ink Free" panose="03080402000500000000" pitchFamily="66" charset="0"/>
+              </a:rPr>
+              <a:t>2x</a:t>
+            </a:r>
+            <a:r>
+              <a:rPr lang="en-US" baseline="30000" dirty="0">
+                <a:latin typeface="Ink Free" panose="03080402000500000000" pitchFamily="66" charset="0"/>
+              </a:rPr>
+              <a:t>2</a:t>
+            </a:r>
+            <a:r>
+              <a:rPr lang="en-US" dirty="0">
+                <a:latin typeface="Ink Free" panose="03080402000500000000" pitchFamily="66" charset="0"/>
+              </a:rPr>
+              <a:t>+12x		= 0</a:t>
+            </a:r>
+          </a:p>
+          <a:p>
+            <a:r>
+              <a:rPr lang="en-US" dirty="0">
+                <a:solidFill>
+                  <a:srgbClr val="FF0000"/>
+                </a:solidFill>
+                <a:latin typeface="Ink Free" panose="03080402000500000000" pitchFamily="66" charset="0"/>
+              </a:rPr>
+              <a:t>2x</a:t>
+            </a:r>
+            <a:r>
+              <a:rPr lang="en-US" dirty="0">
+                <a:latin typeface="Ink Free" panose="03080402000500000000" pitchFamily="66" charset="0"/>
+              </a:rPr>
+              <a:t>(x+6)		= 0</a:t>
+            </a:r>
+          </a:p>
+          <a:p>
+            <a:r>
+              <a:rPr lang="en-US" dirty="0">
+                <a:latin typeface="Ink Free" panose="03080402000500000000" pitchFamily="66" charset="0"/>
+              </a:rPr>
+              <a:t>2x=0 or x+6 </a:t>
+            </a:r>
+            <a:r>
+              <a:rPr lang="en-US">
+                <a:latin typeface="Ink Free" panose="03080402000500000000" pitchFamily="66" charset="0"/>
+              </a:rPr>
+              <a:t>= 0</a:t>
+            </a:r>
+            <a:endParaRPr lang="en-US" dirty="0">
+              <a:latin typeface="Ink Free" panose="03080402000500000000" pitchFamily="66" charset="0"/>
+            </a:endParaRPr>
+          </a:p>
+        </p:txBody>
+      </p:sp>
+    </p:spTree>
+    <p:extLst>
+      <p:ext uri="{BB962C8B-B14F-4D97-AF65-F5344CB8AC3E}">
+        <p14:creationId xmlns:p14="http://schemas.microsoft.com/office/powerpoint/2010/main" val="3536735533"/>
+      </p:ext>
+    </p:extLst>
+  </p:cSld>
+  <p:clrMapOvr>
+    <a:masterClrMapping/>
+  </p:clrMapOvr>
+</p:sld>
+</file>
+
+<file path=ppt/slides/slide12.xml><?xml version="1.0" encoding="utf-8"?>
+<p:sld xmlns:a="http://schemas.openxmlformats.org/drawingml/2006/main" xmlns:r="http://schemas.openxmlformats.org/officeDocument/2006/relationships" xmlns:p="http://schemas.openxmlformats.org/presentationml/2006/main">
+  <p:cSld>
+    <p:spTree>
+      <p:nvGrpSpPr>
+        <p:cNvPr id="1" name=""/>
+        <p:cNvGrpSpPr/>
+        <p:nvPr/>
+      </p:nvGrpSpPr>
+      <p:grpSpPr>
+        <a:xfrm>
+          <a:off x="0" y="0"/>
+          <a:ext cx="0" cy="0"/>
+          <a:chOff x="0" y="0"/>
+          <a:chExt cx="0" cy="0"/>
+        </a:xfrm>
+      </p:grpSpPr>
+      <p:sp>
+        <p:nvSpPr>
+          <p:cNvPr id="2" name="Title 1">
+            <a:extLst>
+              <a:ext uri="{FF2B5EF4-FFF2-40B4-BE49-F238E27FC236}">
+                <a16:creationId xmlns:a16="http://schemas.microsoft.com/office/drawing/2014/main" id="{329B1775-59BB-D728-2E3D-974E7AB44CE9}"/>
+              </a:ext>
+            </a:extLst>
+          </p:cNvPr>
+          <p:cNvSpPr>
+            <a:spLocks noGrp="1"/>
+          </p:cNvSpPr>
+          <p:nvPr>
+            <p:ph type="title"/>
+          </p:nvPr>
+        </p:nvSpPr>
+        <p:spPr/>
+        <p:txBody>
+          <a:bodyPr/>
+          <a:lstStyle/>
+          <a:p>
+            <a:r>
+              <a:rPr lang="en-US" dirty="0"/>
+              <a:t>Solving Binomials</a:t>
+            </a:r>
+          </a:p>
+        </p:txBody>
+      </p:sp>
+      <p:sp>
+        <p:nvSpPr>
+          <p:cNvPr id="3" name="Content Placeholder 2">
+            <a:extLst>
+              <a:ext uri="{FF2B5EF4-FFF2-40B4-BE49-F238E27FC236}">
+                <a16:creationId xmlns:a16="http://schemas.microsoft.com/office/drawing/2014/main" id="{68BA2231-1A96-859C-8EDA-8F269522B2D7}"/>
+              </a:ext>
+            </a:extLst>
+          </p:cNvPr>
+          <p:cNvSpPr>
+            <a:spLocks noGrp="1"/>
+          </p:cNvSpPr>
+          <p:nvPr>
+            <p:ph idx="1"/>
+          </p:nvPr>
+        </p:nvSpPr>
+        <p:spPr/>
+        <p:txBody>
+          <a:bodyPr/>
+          <a:lstStyle/>
+          <a:p>
+            <a:r>
+              <a:rPr lang="en-US" dirty="0">
+                <a:latin typeface="Ink Free" panose="03080402000500000000" pitchFamily="66" charset="0"/>
+              </a:rPr>
+              <a:t>2x</a:t>
+            </a:r>
+            <a:r>
+              <a:rPr lang="en-US" baseline="30000" dirty="0">
+                <a:latin typeface="Ink Free" panose="03080402000500000000" pitchFamily="66" charset="0"/>
+              </a:rPr>
+              <a:t>2</a:t>
+            </a:r>
+            <a:r>
+              <a:rPr lang="en-US" dirty="0">
+                <a:latin typeface="Ink Free" panose="03080402000500000000" pitchFamily="66" charset="0"/>
+              </a:rPr>
+              <a:t>+12x		= 0</a:t>
+            </a:r>
+          </a:p>
+          <a:p>
+            <a:r>
+              <a:rPr lang="en-US" dirty="0">
+                <a:solidFill>
+                  <a:srgbClr val="FF0000"/>
+                </a:solidFill>
+                <a:latin typeface="Ink Free" panose="03080402000500000000" pitchFamily="66" charset="0"/>
+              </a:rPr>
+              <a:t>2x</a:t>
+            </a:r>
+            <a:r>
+              <a:rPr lang="en-US" dirty="0">
+                <a:latin typeface="Ink Free" panose="03080402000500000000" pitchFamily="66" charset="0"/>
+              </a:rPr>
+              <a:t>(x+6)		= 0</a:t>
+            </a:r>
+          </a:p>
+          <a:p>
+            <a:r>
+              <a:rPr lang="en-US" dirty="0">
+                <a:latin typeface="Ink Free" panose="03080402000500000000" pitchFamily="66" charset="0"/>
+              </a:rPr>
+              <a:t>2x=0 or x+6 = 0</a:t>
+            </a:r>
+          </a:p>
+          <a:p>
+            <a:r>
+              <a:rPr lang="en-US" dirty="0">
+                <a:latin typeface="Ink Free" panose="03080402000500000000" pitchFamily="66" charset="0"/>
+              </a:rPr>
+              <a:t>X=0   or  x=-6</a:t>
+            </a:r>
+          </a:p>
+        </p:txBody>
+      </p:sp>
+    </p:spTree>
+    <p:extLst>
+      <p:ext uri="{BB962C8B-B14F-4D97-AF65-F5344CB8AC3E}">
+        <p14:creationId xmlns:p14="http://schemas.microsoft.com/office/powerpoint/2010/main" val="2780551148"/>
+      </p:ext>
+    </p:extLst>
+  </p:cSld>
+  <p:clrMapOvr>
+    <a:masterClrMapping/>
+  </p:clrMapOvr>
+</p:sld>
+</file>
+
+<file path=ppt/slides/slide13.xml><?xml version="1.0" encoding="utf-8"?>
+<p:sld xmlns:a="http://schemas.openxmlformats.org/drawingml/2006/main" xmlns:r="http://schemas.openxmlformats.org/officeDocument/2006/relationships" xmlns:p="http://schemas.openxmlformats.org/presentationml/2006/main">
+  <p:cSld>
+    <p:spTree>
+      <p:nvGrpSpPr>
+        <p:cNvPr id="1" name=""/>
+        <p:cNvGrpSpPr/>
+        <p:nvPr/>
+      </p:nvGrpSpPr>
+      <p:grpSpPr>
+        <a:xfrm>
+          <a:off x="0" y="0"/>
+          <a:ext cx="0" cy="0"/>
+          <a:chOff x="0" y="0"/>
+          <a:chExt cx="0" cy="0"/>
+        </a:xfrm>
+      </p:grpSpPr>
+      <p:sp>
+        <p:nvSpPr>
+          <p:cNvPr id="2" name="Title 1">
+            <a:extLst>
+              <a:ext uri="{FF2B5EF4-FFF2-40B4-BE49-F238E27FC236}">
                 <a16:creationId xmlns:a16="http://schemas.microsoft.com/office/drawing/2014/main" id="{49863BBD-B225-5122-8A30-064EAFFE660C}"/>
               </a:ext>
             </a:extLst>
@@ -3454,7 +3841,7 @@
               <a:t>viewer?f</a:t>
             </a:r>
             <a:r>
-              <a:rPr lang="en-US"/>
+              <a:rPr lang="en-US" dirty="0"/>
               <a:t>=0</a:t>
             </a:r>
           </a:p>
@@ -3592,6 +3979,306 @@
           <a:chExt cx="0" cy="0"/>
         </a:xfrm>
       </p:grpSpPr>
+      <p:pic>
+        <p:nvPicPr>
+          <p:cNvPr id="21" name="Picture 20">
+            <a:extLst>
+              <a:ext uri="{FF2B5EF4-FFF2-40B4-BE49-F238E27FC236}">
+                <a16:creationId xmlns:a16="http://schemas.microsoft.com/office/drawing/2014/main" id="{46386826-9CC0-4D94-E753-CD449FC29001}"/>
+              </a:ext>
+            </a:extLst>
+          </p:cNvPr>
+          <p:cNvPicPr>
+            <a:picLocks noChangeAspect="1"/>
+          </p:cNvPicPr>
+          <p:nvPr/>
+        </p:nvPicPr>
+        <p:blipFill>
+          <a:blip r:embed="rId2"/>
+          <a:stretch>
+            <a:fillRect/>
+          </a:stretch>
+        </p:blipFill>
+        <p:spPr>
+          <a:xfrm>
+            <a:off x="6723947" y="2151976"/>
+            <a:ext cx="2161532" cy="4340899"/>
+          </a:xfrm>
+          <a:prstGeom prst="rect">
+            <a:avLst/>
+          </a:prstGeom>
+        </p:spPr>
+      </p:pic>
+      <p:pic>
+        <p:nvPicPr>
+          <p:cNvPr id="18" name="Content Placeholder 9">
+            <a:extLst>
+              <a:ext uri="{FF2B5EF4-FFF2-40B4-BE49-F238E27FC236}">
+                <a16:creationId xmlns:a16="http://schemas.microsoft.com/office/drawing/2014/main" id="{E2874F67-467C-12AA-2152-298031C2539E}"/>
+              </a:ext>
+            </a:extLst>
+          </p:cNvPr>
+          <p:cNvPicPr>
+            <a:picLocks noChangeAspect="1"/>
+          </p:cNvPicPr>
+          <p:nvPr/>
+        </p:nvPicPr>
+        <p:blipFill>
+          <a:blip r:embed="rId3"/>
+          <a:stretch>
+            <a:fillRect/>
+          </a:stretch>
+        </p:blipFill>
+        <p:spPr>
+          <a:xfrm>
+            <a:off x="8343437" y="4032654"/>
+            <a:ext cx="3644243" cy="2295533"/>
+          </a:xfrm>
+          <a:prstGeom prst="rect">
+            <a:avLst/>
+          </a:prstGeom>
+        </p:spPr>
+      </p:pic>
+      <p:pic>
+        <p:nvPicPr>
+          <p:cNvPr id="11" name="Picture 10">
+            <a:extLst>
+              <a:ext uri="{FF2B5EF4-FFF2-40B4-BE49-F238E27FC236}">
+                <a16:creationId xmlns:a16="http://schemas.microsoft.com/office/drawing/2014/main" id="{4086D64D-6A99-834A-C965-3F9858F65118}"/>
+              </a:ext>
+            </a:extLst>
+          </p:cNvPr>
+          <p:cNvPicPr>
+            <a:picLocks noChangeAspect="1"/>
+          </p:cNvPicPr>
+          <p:nvPr/>
+        </p:nvPicPr>
+        <p:blipFill>
+          <a:blip r:embed="rId4"/>
+          <a:stretch>
+            <a:fillRect/>
+          </a:stretch>
+        </p:blipFill>
+        <p:spPr>
+          <a:xfrm>
+            <a:off x="9260846" y="3593993"/>
+            <a:ext cx="775138" cy="823063"/>
+          </a:xfrm>
+          <a:prstGeom prst="rect">
+            <a:avLst/>
+          </a:prstGeom>
+        </p:spPr>
+      </p:pic>
+      <p:pic>
+        <p:nvPicPr>
+          <p:cNvPr id="12" name="Picture 11">
+            <a:extLst>
+              <a:ext uri="{FF2B5EF4-FFF2-40B4-BE49-F238E27FC236}">
+                <a16:creationId xmlns:a16="http://schemas.microsoft.com/office/drawing/2014/main" id="{51248F8B-667B-39E1-02A3-EA9A8A615F23}"/>
+              </a:ext>
+            </a:extLst>
+          </p:cNvPr>
+          <p:cNvPicPr>
+            <a:picLocks noChangeAspect="1"/>
+          </p:cNvPicPr>
+          <p:nvPr/>
+        </p:nvPicPr>
+        <p:blipFill>
+          <a:blip r:embed="rId5"/>
+          <a:stretch>
+            <a:fillRect/>
+          </a:stretch>
+        </p:blipFill>
+        <p:spPr>
+          <a:xfrm>
+            <a:off x="8711105" y="2770929"/>
+            <a:ext cx="909463" cy="823064"/>
+          </a:xfrm>
+          <a:prstGeom prst="rect">
+            <a:avLst/>
+          </a:prstGeom>
+        </p:spPr>
+      </p:pic>
+      <p:pic>
+        <p:nvPicPr>
+          <p:cNvPr id="13" name="Picture 12">
+            <a:extLst>
+              <a:ext uri="{FF2B5EF4-FFF2-40B4-BE49-F238E27FC236}">
+                <a16:creationId xmlns:a16="http://schemas.microsoft.com/office/drawing/2014/main" id="{2EF298F1-58ED-4E50-7F5D-F1ACA9E75721}"/>
+              </a:ext>
+            </a:extLst>
+          </p:cNvPr>
+          <p:cNvPicPr>
+            <a:picLocks noChangeAspect="1"/>
+          </p:cNvPicPr>
+          <p:nvPr/>
+        </p:nvPicPr>
+        <p:blipFill>
+          <a:blip r:embed="rId5"/>
+          <a:stretch>
+            <a:fillRect/>
+          </a:stretch>
+        </p:blipFill>
+        <p:spPr>
+          <a:xfrm>
+            <a:off x="9710828" y="2737628"/>
+            <a:ext cx="909463" cy="823064"/>
+          </a:xfrm>
+          <a:prstGeom prst="rect">
+            <a:avLst/>
+          </a:prstGeom>
+        </p:spPr>
+      </p:pic>
+      <p:pic>
+        <p:nvPicPr>
+          <p:cNvPr id="14" name="Picture 13">
+            <a:extLst>
+              <a:ext uri="{FF2B5EF4-FFF2-40B4-BE49-F238E27FC236}">
+                <a16:creationId xmlns:a16="http://schemas.microsoft.com/office/drawing/2014/main" id="{EFA1128C-7C19-7DB5-C411-507BFC9C648B}"/>
+              </a:ext>
+            </a:extLst>
+          </p:cNvPr>
+          <p:cNvPicPr>
+            <a:picLocks noChangeAspect="1"/>
+          </p:cNvPicPr>
+          <p:nvPr/>
+        </p:nvPicPr>
+        <p:blipFill>
+          <a:blip r:embed="rId4"/>
+          <a:stretch>
+            <a:fillRect/>
+          </a:stretch>
+        </p:blipFill>
+        <p:spPr>
+          <a:xfrm>
+            <a:off x="10053144" y="3703655"/>
+            <a:ext cx="775138" cy="823063"/>
+          </a:xfrm>
+          <a:prstGeom prst="rect">
+            <a:avLst/>
+          </a:prstGeom>
+        </p:spPr>
+      </p:pic>
+      <p:pic>
+        <p:nvPicPr>
+          <p:cNvPr id="15" name="Picture 14">
+            <a:extLst>
+              <a:ext uri="{FF2B5EF4-FFF2-40B4-BE49-F238E27FC236}">
+                <a16:creationId xmlns:a16="http://schemas.microsoft.com/office/drawing/2014/main" id="{9B736274-BC2C-8F82-2995-5A9A1F3DCA6B}"/>
+              </a:ext>
+            </a:extLst>
+          </p:cNvPr>
+          <p:cNvPicPr>
+            <a:picLocks noChangeAspect="1"/>
+          </p:cNvPicPr>
+          <p:nvPr/>
+        </p:nvPicPr>
+        <p:blipFill>
+          <a:blip r:embed="rId4"/>
+          <a:stretch>
+            <a:fillRect/>
+          </a:stretch>
+        </p:blipFill>
+        <p:spPr>
+          <a:xfrm>
+            <a:off x="8520943" y="3703655"/>
+            <a:ext cx="775138" cy="823063"/>
+          </a:xfrm>
+          <a:prstGeom prst="rect">
+            <a:avLst/>
+          </a:prstGeom>
+        </p:spPr>
+      </p:pic>
+      <p:pic>
+        <p:nvPicPr>
+          <p:cNvPr id="16" name="Picture 15">
+            <a:extLst>
+              <a:ext uri="{FF2B5EF4-FFF2-40B4-BE49-F238E27FC236}">
+                <a16:creationId xmlns:a16="http://schemas.microsoft.com/office/drawing/2014/main" id="{40B84B42-57EF-C8FF-103B-A09320C42F98}"/>
+              </a:ext>
+            </a:extLst>
+          </p:cNvPr>
+          <p:cNvPicPr>
+            <a:picLocks noChangeAspect="1"/>
+          </p:cNvPicPr>
+          <p:nvPr/>
+        </p:nvPicPr>
+        <p:blipFill>
+          <a:blip r:embed="rId4"/>
+          <a:stretch>
+            <a:fillRect/>
+          </a:stretch>
+        </p:blipFill>
+        <p:spPr>
+          <a:xfrm>
+            <a:off x="10845442" y="3705243"/>
+            <a:ext cx="775138" cy="823063"/>
+          </a:xfrm>
+          <a:prstGeom prst="rect">
+            <a:avLst/>
+          </a:prstGeom>
+        </p:spPr>
+      </p:pic>
+      <p:pic>
+        <p:nvPicPr>
+          <p:cNvPr id="17" name="Picture 16">
+            <a:extLst>
+              <a:ext uri="{FF2B5EF4-FFF2-40B4-BE49-F238E27FC236}">
+                <a16:creationId xmlns:a16="http://schemas.microsoft.com/office/drawing/2014/main" id="{625011F8-343C-B9B6-0EBE-7CFE7A04693E}"/>
+              </a:ext>
+            </a:extLst>
+          </p:cNvPr>
+          <p:cNvPicPr>
+            <a:picLocks noChangeAspect="1"/>
+          </p:cNvPicPr>
+          <p:nvPr/>
+        </p:nvPicPr>
+        <p:blipFill>
+          <a:blip r:embed="rId4"/>
+          <a:stretch>
+            <a:fillRect/>
+          </a:stretch>
+        </p:blipFill>
+        <p:spPr>
+          <a:xfrm>
+            <a:off x="10745117" y="2770930"/>
+            <a:ext cx="775138" cy="823063"/>
+          </a:xfrm>
+          <a:prstGeom prst="rect">
+            <a:avLst/>
+          </a:prstGeom>
+        </p:spPr>
+      </p:pic>
+      <p:pic>
+        <p:nvPicPr>
+          <p:cNvPr id="20" name="Picture 19">
+            <a:extLst>
+              <a:ext uri="{FF2B5EF4-FFF2-40B4-BE49-F238E27FC236}">
+                <a16:creationId xmlns:a16="http://schemas.microsoft.com/office/drawing/2014/main" id="{593D6C87-7193-E868-7DCF-42A6489D3067}"/>
+              </a:ext>
+            </a:extLst>
+          </p:cNvPr>
+          <p:cNvPicPr>
+            <a:picLocks noChangeAspect="1"/>
+          </p:cNvPicPr>
+          <p:nvPr/>
+        </p:nvPicPr>
+        <p:blipFill>
+          <a:blip r:embed="rId2"/>
+          <a:stretch>
+            <a:fillRect/>
+          </a:stretch>
+        </p:blipFill>
+        <p:spPr>
+          <a:xfrm>
+            <a:off x="516384" y="2080369"/>
+            <a:ext cx="2161532" cy="4340899"/>
+          </a:xfrm>
+          <a:prstGeom prst="rect">
+            <a:avLst/>
+          </a:prstGeom>
+        </p:spPr>
+      </p:pic>
       <p:sp>
         <p:nvSpPr>
           <p:cNvPr id="2" name="Title 1">
@@ -3615,35 +4302,263 @@
           <a:p>
             <a:r>
               <a:rPr lang="en-US" dirty="0"/>
-              <a:t>Factor Numbers</a:t>
-            </a:r>
-          </a:p>
-        </p:txBody>
-      </p:sp>
-      <p:sp>
-        <p:nvSpPr>
-          <p:cNvPr id="3" name="Content Placeholder 2">
-            <a:extLst>
-              <a:ext uri="{FF2B5EF4-FFF2-40B4-BE49-F238E27FC236}">
-                <a16:creationId xmlns:a16="http://schemas.microsoft.com/office/drawing/2014/main" id="{59EC99EA-397C-1259-8E89-A68CD25A8785}"/>
-              </a:ext>
-            </a:extLst>
-          </p:cNvPr>
-          <p:cNvSpPr>
-            <a:spLocks noGrp="1"/>
-          </p:cNvSpPr>
+              <a:t>Factoring as grouping</a:t>
+            </a:r>
+          </a:p>
+        </p:txBody>
+      </p:sp>
+      <p:pic>
+        <p:nvPicPr>
+          <p:cNvPr id="10" name="Content Placeholder 9">
+            <a:extLst>
+              <a:ext uri="{FF2B5EF4-FFF2-40B4-BE49-F238E27FC236}">
+                <a16:creationId xmlns:a16="http://schemas.microsoft.com/office/drawing/2014/main" id="{9E99CD97-FC7D-A59F-6505-2624403E071E}"/>
+              </a:ext>
+            </a:extLst>
+          </p:cNvPr>
+          <p:cNvPicPr>
+            <a:picLocks noGrp="1" noChangeAspect="1"/>
+          </p:cNvPicPr>
           <p:nvPr>
             <p:ph idx="1"/>
           </p:nvPr>
-        </p:nvSpPr>
-        <p:spPr/>
-        <p:txBody>
-          <a:bodyPr/>
-          <a:lstStyle/>
-          <a:p>
-            <a:r>
-              <a:rPr lang="en-US" dirty="0"/>
-              <a:t>12+20</a:t>
+        </p:nvPicPr>
+        <p:blipFill>
+          <a:blip r:embed="rId3"/>
+          <a:stretch>
+            <a:fillRect/>
+          </a:stretch>
+        </p:blipFill>
+        <p:spPr>
+          <a:xfrm>
+            <a:off x="2279898" y="4027039"/>
+            <a:ext cx="3644243" cy="2295533"/>
+          </a:xfrm>
+          <a:prstGeom prst="rect">
+            <a:avLst/>
+          </a:prstGeom>
+        </p:spPr>
+      </p:pic>
+      <p:pic>
+        <p:nvPicPr>
+          <p:cNvPr id="5" name="Picture 4">
+            <a:extLst>
+              <a:ext uri="{FF2B5EF4-FFF2-40B4-BE49-F238E27FC236}">
+                <a16:creationId xmlns:a16="http://schemas.microsoft.com/office/drawing/2014/main" id="{9BAB164A-6EFD-04D0-2EC2-377B62ED2541}"/>
+              </a:ext>
+            </a:extLst>
+          </p:cNvPr>
+          <p:cNvPicPr>
+            <a:picLocks noChangeAspect="1"/>
+          </p:cNvPicPr>
+          <p:nvPr/>
+        </p:nvPicPr>
+        <p:blipFill>
+          <a:blip r:embed="rId4"/>
+          <a:stretch>
+            <a:fillRect/>
+          </a:stretch>
+        </p:blipFill>
+        <p:spPr>
+          <a:xfrm>
+            <a:off x="3590515" y="3729626"/>
+            <a:ext cx="775138" cy="823063"/>
+          </a:xfrm>
+          <a:prstGeom prst="rect">
+            <a:avLst/>
+          </a:prstGeom>
+        </p:spPr>
+      </p:pic>
+      <p:pic>
+        <p:nvPicPr>
+          <p:cNvPr id="6" name="Picture 5">
+            <a:extLst>
+              <a:ext uri="{FF2B5EF4-FFF2-40B4-BE49-F238E27FC236}">
+                <a16:creationId xmlns:a16="http://schemas.microsoft.com/office/drawing/2014/main" id="{7264543C-A875-1341-6DE2-D872C87D159A}"/>
+              </a:ext>
+            </a:extLst>
+          </p:cNvPr>
+          <p:cNvPicPr>
+            <a:picLocks noChangeAspect="1"/>
+          </p:cNvPicPr>
+          <p:nvPr/>
+        </p:nvPicPr>
+        <p:blipFill>
+          <a:blip r:embed="rId5"/>
+          <a:stretch>
+            <a:fillRect/>
+          </a:stretch>
+        </p:blipFill>
+        <p:spPr>
+          <a:xfrm>
+            <a:off x="3006208" y="3094313"/>
+            <a:ext cx="909463" cy="823064"/>
+          </a:xfrm>
+          <a:prstGeom prst="rect">
+            <a:avLst/>
+          </a:prstGeom>
+        </p:spPr>
+      </p:pic>
+      <p:pic>
+        <p:nvPicPr>
+          <p:cNvPr id="7" name="Picture 6">
+            <a:extLst>
+              <a:ext uri="{FF2B5EF4-FFF2-40B4-BE49-F238E27FC236}">
+                <a16:creationId xmlns:a16="http://schemas.microsoft.com/office/drawing/2014/main" id="{4CFBC766-603F-B282-7552-1732C2F49DB5}"/>
+              </a:ext>
+            </a:extLst>
+          </p:cNvPr>
+          <p:cNvPicPr>
+            <a:picLocks noChangeAspect="1"/>
+          </p:cNvPicPr>
+          <p:nvPr/>
+        </p:nvPicPr>
+        <p:blipFill>
+          <a:blip r:embed="rId5"/>
+          <a:stretch>
+            <a:fillRect/>
+          </a:stretch>
+        </p:blipFill>
+        <p:spPr>
+          <a:xfrm>
+            <a:off x="4040497" y="3042195"/>
+            <a:ext cx="909463" cy="823064"/>
+          </a:xfrm>
+          <a:prstGeom prst="rect">
+            <a:avLst/>
+          </a:prstGeom>
+        </p:spPr>
+      </p:pic>
+      <p:pic>
+        <p:nvPicPr>
+          <p:cNvPr id="8" name="Picture 7">
+            <a:extLst>
+              <a:ext uri="{FF2B5EF4-FFF2-40B4-BE49-F238E27FC236}">
+                <a16:creationId xmlns:a16="http://schemas.microsoft.com/office/drawing/2014/main" id="{6C366DF0-1F06-A2BB-D7B8-786BF4CFF119}"/>
+              </a:ext>
+            </a:extLst>
+          </p:cNvPr>
+          <p:cNvPicPr>
+            <a:picLocks noChangeAspect="1"/>
+          </p:cNvPicPr>
+          <p:nvPr/>
+        </p:nvPicPr>
+        <p:blipFill>
+          <a:blip r:embed="rId4"/>
+          <a:stretch>
+            <a:fillRect/>
+          </a:stretch>
+        </p:blipFill>
+        <p:spPr>
+          <a:xfrm>
+            <a:off x="4382813" y="3839288"/>
+            <a:ext cx="775138" cy="823063"/>
+          </a:xfrm>
+          <a:prstGeom prst="rect">
+            <a:avLst/>
+          </a:prstGeom>
+        </p:spPr>
+      </p:pic>
+      <p:pic>
+        <p:nvPicPr>
+          <p:cNvPr id="9" name="Picture 8">
+            <a:extLst>
+              <a:ext uri="{FF2B5EF4-FFF2-40B4-BE49-F238E27FC236}">
+                <a16:creationId xmlns:a16="http://schemas.microsoft.com/office/drawing/2014/main" id="{9A0F214E-5E62-09FF-D2C0-459B618D6B3F}"/>
+              </a:ext>
+            </a:extLst>
+          </p:cNvPr>
+          <p:cNvPicPr>
+            <a:picLocks noChangeAspect="1"/>
+          </p:cNvPicPr>
+          <p:nvPr/>
+        </p:nvPicPr>
+        <p:blipFill>
+          <a:blip r:embed="rId4"/>
+          <a:stretch>
+            <a:fillRect/>
+          </a:stretch>
+        </p:blipFill>
+        <p:spPr>
+          <a:xfrm>
+            <a:off x="2850612" y="3839288"/>
+            <a:ext cx="775138" cy="823063"/>
+          </a:xfrm>
+          <a:prstGeom prst="rect">
+            <a:avLst/>
+          </a:prstGeom>
+        </p:spPr>
+      </p:pic>
+      <p:sp>
+        <p:nvSpPr>
+          <p:cNvPr id="23" name="TextBox 22">
+            <a:extLst>
+              <a:ext uri="{FF2B5EF4-FFF2-40B4-BE49-F238E27FC236}">
+                <a16:creationId xmlns:a16="http://schemas.microsoft.com/office/drawing/2014/main" id="{37DAD68A-654F-4577-219D-33D29F82EDD6}"/>
+              </a:ext>
+            </a:extLst>
+          </p:cNvPr>
+          <p:cNvSpPr txBox="1"/>
+          <p:nvPr/>
+        </p:nvSpPr>
+        <p:spPr>
+          <a:xfrm>
+            <a:off x="1078746" y="2834046"/>
+            <a:ext cx="2204226" cy="461665"/>
+          </a:xfrm>
+          <a:prstGeom prst="rect">
+            <a:avLst/>
+          </a:prstGeom>
+          <a:noFill/>
+        </p:spPr>
+        <p:txBody>
+          <a:bodyPr wrap="square" rtlCol="0">
+            <a:spAutoFit/>
+          </a:bodyPr>
+          <a:lstStyle/>
+          <a:p>
+            <a:r>
+              <a:rPr lang="en-US" sz="2400" dirty="0">
+                <a:latin typeface="Ink Free" panose="03080402000500000000" pitchFamily="66" charset="0"/>
+              </a:rPr>
+              <a:t>Sally</a:t>
+            </a:r>
+          </a:p>
+        </p:txBody>
+      </p:sp>
+      <p:sp>
+        <p:nvSpPr>
+          <p:cNvPr id="25" name="TextBox 24">
+            <a:extLst>
+              <a:ext uri="{FF2B5EF4-FFF2-40B4-BE49-F238E27FC236}">
+                <a16:creationId xmlns:a16="http://schemas.microsoft.com/office/drawing/2014/main" id="{C57FA3B1-8577-63F4-39A3-6C52EC33D9D8}"/>
+              </a:ext>
+            </a:extLst>
+          </p:cNvPr>
+          <p:cNvSpPr txBox="1"/>
+          <p:nvPr/>
+        </p:nvSpPr>
+        <p:spPr>
+          <a:xfrm>
+            <a:off x="7193576" y="2912997"/>
+            <a:ext cx="2204226" cy="461665"/>
+          </a:xfrm>
+          <a:prstGeom prst="rect">
+            <a:avLst/>
+          </a:prstGeom>
+          <a:noFill/>
+        </p:spPr>
+        <p:txBody>
+          <a:bodyPr wrap="square" rtlCol="0">
+            <a:spAutoFit/>
+          </a:bodyPr>
+          <a:lstStyle/>
+          <a:p>
+            <a:r>
+              <a:rPr lang="en-US" sz="2400" dirty="0">
+                <a:latin typeface="Ink Free" panose="03080402000500000000" pitchFamily="66" charset="0"/>
+              </a:rPr>
+              <a:t>Johnny</a:t>
             </a:r>
           </a:p>
         </p:txBody>
@@ -3678,6 +4593,306 @@
           <a:chExt cx="0" cy="0"/>
         </a:xfrm>
       </p:grpSpPr>
+      <p:pic>
+        <p:nvPicPr>
+          <p:cNvPr id="21" name="Picture 20">
+            <a:extLst>
+              <a:ext uri="{FF2B5EF4-FFF2-40B4-BE49-F238E27FC236}">
+                <a16:creationId xmlns:a16="http://schemas.microsoft.com/office/drawing/2014/main" id="{46386826-9CC0-4D94-E753-CD449FC29001}"/>
+              </a:ext>
+            </a:extLst>
+          </p:cNvPr>
+          <p:cNvPicPr>
+            <a:picLocks noChangeAspect="1"/>
+          </p:cNvPicPr>
+          <p:nvPr/>
+        </p:nvPicPr>
+        <p:blipFill>
+          <a:blip r:embed="rId2"/>
+          <a:stretch>
+            <a:fillRect/>
+          </a:stretch>
+        </p:blipFill>
+        <p:spPr>
+          <a:xfrm>
+            <a:off x="7322720" y="3607320"/>
+            <a:ext cx="1436850" cy="2885555"/>
+          </a:xfrm>
+          <a:prstGeom prst="rect">
+            <a:avLst/>
+          </a:prstGeom>
+        </p:spPr>
+      </p:pic>
+      <p:pic>
+        <p:nvPicPr>
+          <p:cNvPr id="18" name="Content Placeholder 9">
+            <a:extLst>
+              <a:ext uri="{FF2B5EF4-FFF2-40B4-BE49-F238E27FC236}">
+                <a16:creationId xmlns:a16="http://schemas.microsoft.com/office/drawing/2014/main" id="{E2874F67-467C-12AA-2152-298031C2539E}"/>
+              </a:ext>
+            </a:extLst>
+          </p:cNvPr>
+          <p:cNvPicPr>
+            <a:picLocks noChangeAspect="1"/>
+          </p:cNvPicPr>
+          <p:nvPr/>
+        </p:nvPicPr>
+        <p:blipFill>
+          <a:blip r:embed="rId3"/>
+          <a:stretch>
+            <a:fillRect/>
+          </a:stretch>
+        </p:blipFill>
+        <p:spPr>
+          <a:xfrm>
+            <a:off x="8665254" y="4966950"/>
+            <a:ext cx="2422462" cy="1525925"/>
+          </a:xfrm>
+          <a:prstGeom prst="rect">
+            <a:avLst/>
+          </a:prstGeom>
+        </p:spPr>
+      </p:pic>
+      <p:pic>
+        <p:nvPicPr>
+          <p:cNvPr id="11" name="Picture 10">
+            <a:extLst>
+              <a:ext uri="{FF2B5EF4-FFF2-40B4-BE49-F238E27FC236}">
+                <a16:creationId xmlns:a16="http://schemas.microsoft.com/office/drawing/2014/main" id="{4086D64D-6A99-834A-C965-3F9858F65118}"/>
+              </a:ext>
+            </a:extLst>
+          </p:cNvPr>
+          <p:cNvPicPr>
+            <a:picLocks noChangeAspect="1"/>
+          </p:cNvPicPr>
+          <p:nvPr/>
+        </p:nvPicPr>
+        <p:blipFill>
+          <a:blip r:embed="rId4"/>
+          <a:stretch>
+            <a:fillRect/>
+          </a:stretch>
+        </p:blipFill>
+        <p:spPr>
+          <a:xfrm>
+            <a:off x="9463548" y="4726691"/>
+            <a:ext cx="515263" cy="547120"/>
+          </a:xfrm>
+          <a:prstGeom prst="rect">
+            <a:avLst/>
+          </a:prstGeom>
+        </p:spPr>
+      </p:pic>
+      <p:pic>
+        <p:nvPicPr>
+          <p:cNvPr id="12" name="Picture 11">
+            <a:extLst>
+              <a:ext uri="{FF2B5EF4-FFF2-40B4-BE49-F238E27FC236}">
+                <a16:creationId xmlns:a16="http://schemas.microsoft.com/office/drawing/2014/main" id="{51248F8B-667B-39E1-02A3-EA9A8A615F23}"/>
+              </a:ext>
+            </a:extLst>
+          </p:cNvPr>
+          <p:cNvPicPr>
+            <a:picLocks noChangeAspect="1"/>
+          </p:cNvPicPr>
+          <p:nvPr/>
+        </p:nvPicPr>
+        <p:blipFill>
+          <a:blip r:embed="rId5"/>
+          <a:stretch>
+            <a:fillRect/>
+          </a:stretch>
+        </p:blipFill>
+        <p:spPr>
+          <a:xfrm>
+            <a:off x="5648876" y="2286283"/>
+            <a:ext cx="604554" cy="547121"/>
+          </a:xfrm>
+          <a:prstGeom prst="rect">
+            <a:avLst/>
+          </a:prstGeom>
+        </p:spPr>
+      </p:pic>
+      <p:pic>
+        <p:nvPicPr>
+          <p:cNvPr id="13" name="Picture 12">
+            <a:extLst>
+              <a:ext uri="{FF2B5EF4-FFF2-40B4-BE49-F238E27FC236}">
+                <a16:creationId xmlns:a16="http://schemas.microsoft.com/office/drawing/2014/main" id="{2EF298F1-58ED-4E50-7F5D-F1ACA9E75721}"/>
+              </a:ext>
+            </a:extLst>
+          </p:cNvPr>
+          <p:cNvPicPr>
+            <a:picLocks noChangeAspect="1"/>
+          </p:cNvPicPr>
+          <p:nvPr/>
+        </p:nvPicPr>
+        <p:blipFill>
+          <a:blip r:embed="rId5"/>
+          <a:stretch>
+            <a:fillRect/>
+          </a:stretch>
+        </p:blipFill>
+        <p:spPr>
+          <a:xfrm>
+            <a:off x="6253430" y="2286283"/>
+            <a:ext cx="604554" cy="547121"/>
+          </a:xfrm>
+          <a:prstGeom prst="rect">
+            <a:avLst/>
+          </a:prstGeom>
+        </p:spPr>
+      </p:pic>
+      <p:pic>
+        <p:nvPicPr>
+          <p:cNvPr id="14" name="Picture 13">
+            <a:extLst>
+              <a:ext uri="{FF2B5EF4-FFF2-40B4-BE49-F238E27FC236}">
+                <a16:creationId xmlns:a16="http://schemas.microsoft.com/office/drawing/2014/main" id="{EFA1128C-7C19-7DB5-C411-507BFC9C648B}"/>
+              </a:ext>
+            </a:extLst>
+          </p:cNvPr>
+          <p:cNvPicPr>
+            <a:picLocks noChangeAspect="1"/>
+          </p:cNvPicPr>
+          <p:nvPr/>
+        </p:nvPicPr>
+        <p:blipFill>
+          <a:blip r:embed="rId4"/>
+          <a:stretch>
+            <a:fillRect/>
+          </a:stretch>
+        </p:blipFill>
+        <p:spPr>
+          <a:xfrm>
+            <a:off x="10047518" y="4750642"/>
+            <a:ext cx="515263" cy="547120"/>
+          </a:xfrm>
+          <a:prstGeom prst="rect">
+            <a:avLst/>
+          </a:prstGeom>
+        </p:spPr>
+      </p:pic>
+      <p:pic>
+        <p:nvPicPr>
+          <p:cNvPr id="15" name="Picture 14">
+            <a:extLst>
+              <a:ext uri="{FF2B5EF4-FFF2-40B4-BE49-F238E27FC236}">
+                <a16:creationId xmlns:a16="http://schemas.microsoft.com/office/drawing/2014/main" id="{9B736274-BC2C-8F82-2995-5A9A1F3DCA6B}"/>
+              </a:ext>
+            </a:extLst>
+          </p:cNvPr>
+          <p:cNvPicPr>
+            <a:picLocks noChangeAspect="1"/>
+          </p:cNvPicPr>
+          <p:nvPr/>
+        </p:nvPicPr>
+        <p:blipFill>
+          <a:blip r:embed="rId4"/>
+          <a:stretch>
+            <a:fillRect/>
+          </a:stretch>
+        </p:blipFill>
+        <p:spPr>
+          <a:xfrm>
+            <a:off x="8911702" y="4763797"/>
+            <a:ext cx="515263" cy="547120"/>
+          </a:xfrm>
+          <a:prstGeom prst="rect">
+            <a:avLst/>
+          </a:prstGeom>
+        </p:spPr>
+      </p:pic>
+      <p:pic>
+        <p:nvPicPr>
+          <p:cNvPr id="16" name="Picture 15">
+            <a:extLst>
+              <a:ext uri="{FF2B5EF4-FFF2-40B4-BE49-F238E27FC236}">
+                <a16:creationId xmlns:a16="http://schemas.microsoft.com/office/drawing/2014/main" id="{40B84B42-57EF-C8FF-103B-A09320C42F98}"/>
+              </a:ext>
+            </a:extLst>
+          </p:cNvPr>
+          <p:cNvPicPr>
+            <a:picLocks noChangeAspect="1"/>
+          </p:cNvPicPr>
+          <p:nvPr/>
+        </p:nvPicPr>
+        <p:blipFill>
+          <a:blip r:embed="rId4"/>
+          <a:stretch>
+            <a:fillRect/>
+          </a:stretch>
+        </p:blipFill>
+        <p:spPr>
+          <a:xfrm>
+            <a:off x="10599364" y="4750642"/>
+            <a:ext cx="515263" cy="547120"/>
+          </a:xfrm>
+          <a:prstGeom prst="rect">
+            <a:avLst/>
+          </a:prstGeom>
+        </p:spPr>
+      </p:pic>
+      <p:pic>
+        <p:nvPicPr>
+          <p:cNvPr id="17" name="Picture 16">
+            <a:extLst>
+              <a:ext uri="{FF2B5EF4-FFF2-40B4-BE49-F238E27FC236}">
+                <a16:creationId xmlns:a16="http://schemas.microsoft.com/office/drawing/2014/main" id="{625011F8-343C-B9B6-0EBE-7CFE7A04693E}"/>
+              </a:ext>
+            </a:extLst>
+          </p:cNvPr>
+          <p:cNvPicPr>
+            <a:picLocks noChangeAspect="1"/>
+          </p:cNvPicPr>
+          <p:nvPr/>
+        </p:nvPicPr>
+        <p:blipFill>
+          <a:blip r:embed="rId4"/>
+          <a:stretch>
+            <a:fillRect/>
+          </a:stretch>
+        </p:blipFill>
+        <p:spPr>
+          <a:xfrm>
+            <a:off x="10379567" y="4152123"/>
+            <a:ext cx="515263" cy="547120"/>
+          </a:xfrm>
+          <a:prstGeom prst="rect">
+            <a:avLst/>
+          </a:prstGeom>
+        </p:spPr>
+      </p:pic>
+      <p:pic>
+        <p:nvPicPr>
+          <p:cNvPr id="20" name="Picture 19">
+            <a:extLst>
+              <a:ext uri="{FF2B5EF4-FFF2-40B4-BE49-F238E27FC236}">
+                <a16:creationId xmlns:a16="http://schemas.microsoft.com/office/drawing/2014/main" id="{593D6C87-7193-E868-7DCF-42A6489D3067}"/>
+              </a:ext>
+            </a:extLst>
+          </p:cNvPr>
+          <p:cNvPicPr>
+            <a:picLocks noChangeAspect="1"/>
+          </p:cNvPicPr>
+          <p:nvPr/>
+        </p:nvPicPr>
+        <p:blipFill>
+          <a:blip r:embed="rId2"/>
+          <a:stretch>
+            <a:fillRect/>
+          </a:stretch>
+        </p:blipFill>
+        <p:spPr>
+          <a:xfrm>
+            <a:off x="1345784" y="3429000"/>
+            <a:ext cx="1436850" cy="2885555"/>
+          </a:xfrm>
+          <a:prstGeom prst="rect">
+            <a:avLst/>
+          </a:prstGeom>
+        </p:spPr>
+      </p:pic>
       <p:sp>
         <p:nvSpPr>
           <p:cNvPr id="2" name="Title 1">
@@ -3701,69 +4916,137 @@
           <a:p>
             <a:r>
               <a:rPr lang="en-US" dirty="0"/>
-              <a:t>Factor Numbers</a:t>
-            </a:r>
-          </a:p>
-        </p:txBody>
-      </p:sp>
-      <p:sp>
-        <p:nvSpPr>
-          <p:cNvPr id="3" name="Content Placeholder 2">
-            <a:extLst>
-              <a:ext uri="{FF2B5EF4-FFF2-40B4-BE49-F238E27FC236}">
-                <a16:creationId xmlns:a16="http://schemas.microsoft.com/office/drawing/2014/main" id="{59EC99EA-397C-1259-8E89-A68CD25A8785}"/>
-              </a:ext>
-            </a:extLst>
-          </p:cNvPr>
-          <p:cNvSpPr>
-            <a:spLocks noGrp="1"/>
-          </p:cNvSpPr>
+              <a:t>Factoring as grouping</a:t>
+            </a:r>
+          </a:p>
+        </p:txBody>
+      </p:sp>
+      <p:pic>
+        <p:nvPicPr>
+          <p:cNvPr id="10" name="Content Placeholder 9">
+            <a:extLst>
+              <a:ext uri="{FF2B5EF4-FFF2-40B4-BE49-F238E27FC236}">
+                <a16:creationId xmlns:a16="http://schemas.microsoft.com/office/drawing/2014/main" id="{9E99CD97-FC7D-A59F-6505-2624403E071E}"/>
+              </a:ext>
+            </a:extLst>
+          </p:cNvPr>
+          <p:cNvPicPr>
+            <a:picLocks noGrp="1" noChangeAspect="1"/>
+          </p:cNvPicPr>
           <p:nvPr>
             <p:ph idx="1"/>
           </p:nvPr>
-        </p:nvSpPr>
-        <p:spPr/>
-        <p:txBody>
-          <a:bodyPr/>
-          <a:lstStyle/>
-          <a:p>
-            <a:r>
-              <a:rPr lang="en-US" dirty="0"/>
-              <a:t>12+20</a:t>
-            </a:r>
-          </a:p>
-          <a:p>
-            <a:r>
-              <a:rPr lang="en-US" dirty="0">
-                <a:solidFill>
-                  <a:srgbClr val="FF0000"/>
-                </a:solidFill>
-              </a:rPr>
-              <a:t>4</a:t>
-            </a:r>
-            <a:r>
-              <a:rPr lang="en-US" dirty="0"/>
-              <a:t>*3 + </a:t>
-            </a:r>
-            <a:r>
-              <a:rPr lang="en-US" dirty="0">
-                <a:solidFill>
-                  <a:srgbClr val="FF0000"/>
-                </a:solidFill>
-              </a:rPr>
-              <a:t>4</a:t>
-            </a:r>
-            <a:r>
-              <a:rPr lang="en-US" dirty="0"/>
-              <a:t>*5</a:t>
-            </a:r>
-          </a:p>
-        </p:txBody>
-      </p:sp>
+        </p:nvPicPr>
+        <p:blipFill>
+          <a:blip r:embed="rId3"/>
+          <a:stretch>
+            <a:fillRect/>
+          </a:stretch>
+        </p:blipFill>
+        <p:spPr>
+          <a:xfrm>
+            <a:off x="2601715" y="4796646"/>
+            <a:ext cx="2422462" cy="1525925"/>
+          </a:xfrm>
+          <a:prstGeom prst="rect">
+            <a:avLst/>
+          </a:prstGeom>
+        </p:spPr>
+      </p:pic>
+      <p:pic>
+        <p:nvPicPr>
+          <p:cNvPr id="5" name="Picture 4">
+            <a:extLst>
+              <a:ext uri="{FF2B5EF4-FFF2-40B4-BE49-F238E27FC236}">
+                <a16:creationId xmlns:a16="http://schemas.microsoft.com/office/drawing/2014/main" id="{9BAB164A-6EFD-04D0-2EC2-377B62ED2541}"/>
+              </a:ext>
+            </a:extLst>
+          </p:cNvPr>
+          <p:cNvPicPr>
+            <a:picLocks noChangeAspect="1"/>
+          </p:cNvPicPr>
+          <p:nvPr/>
+        </p:nvPicPr>
+        <p:blipFill>
+          <a:blip r:embed="rId4"/>
+          <a:stretch>
+            <a:fillRect/>
+          </a:stretch>
+        </p:blipFill>
+        <p:spPr>
+          <a:xfrm>
+            <a:off x="3519350" y="4548754"/>
+            <a:ext cx="515263" cy="547120"/>
+          </a:xfrm>
+          <a:prstGeom prst="rect">
+            <a:avLst/>
+          </a:prstGeom>
+        </p:spPr>
+      </p:pic>
+      <p:pic>
+        <p:nvPicPr>
+          <p:cNvPr id="8" name="Picture 7">
+            <a:extLst>
+              <a:ext uri="{FF2B5EF4-FFF2-40B4-BE49-F238E27FC236}">
+                <a16:creationId xmlns:a16="http://schemas.microsoft.com/office/drawing/2014/main" id="{6C366DF0-1F06-A2BB-D7B8-786BF4CFF119}"/>
+              </a:ext>
+            </a:extLst>
+          </p:cNvPr>
+          <p:cNvPicPr>
+            <a:picLocks noChangeAspect="1"/>
+          </p:cNvPicPr>
+          <p:nvPr/>
+        </p:nvPicPr>
+        <p:blipFill>
+          <a:blip r:embed="rId4"/>
+          <a:stretch>
+            <a:fillRect/>
+          </a:stretch>
+        </p:blipFill>
+        <p:spPr>
+          <a:xfrm>
+            <a:off x="4223484" y="4548754"/>
+            <a:ext cx="515263" cy="547120"/>
+          </a:xfrm>
+          <a:prstGeom prst="rect">
+            <a:avLst/>
+          </a:prstGeom>
+        </p:spPr>
+      </p:pic>
+      <p:pic>
+        <p:nvPicPr>
+          <p:cNvPr id="9" name="Picture 8">
+            <a:extLst>
+              <a:ext uri="{FF2B5EF4-FFF2-40B4-BE49-F238E27FC236}">
+                <a16:creationId xmlns:a16="http://schemas.microsoft.com/office/drawing/2014/main" id="{9A0F214E-5E62-09FF-D2C0-459B618D6B3F}"/>
+              </a:ext>
+            </a:extLst>
+          </p:cNvPr>
+          <p:cNvPicPr>
+            <a:picLocks noChangeAspect="1"/>
+          </p:cNvPicPr>
+          <p:nvPr/>
+        </p:nvPicPr>
+        <p:blipFill>
+          <a:blip r:embed="rId4"/>
+          <a:stretch>
+            <a:fillRect/>
+          </a:stretch>
+        </p:blipFill>
+        <p:spPr>
+          <a:xfrm>
+            <a:off x="2794315" y="4548754"/>
+            <a:ext cx="515263" cy="547120"/>
+          </a:xfrm>
+          <a:prstGeom prst="rect">
+            <a:avLst/>
+          </a:prstGeom>
+        </p:spPr>
+      </p:pic>
     </p:spTree>
     <p:extLst>
       <p:ext uri="{BB962C8B-B14F-4D97-AF65-F5344CB8AC3E}">
-        <p14:creationId xmlns:p14="http://schemas.microsoft.com/office/powerpoint/2010/main" val="1592092554"/>
+        <p14:creationId xmlns:p14="http://schemas.microsoft.com/office/powerpoint/2010/main" val="3701521936"/>
       </p:ext>
     </p:extLst>
   </p:cSld>
@@ -3795,7 +5078,7 @@
           <p:cNvPr id="2" name="Title 1">
             <a:extLst>
               <a:ext uri="{FF2B5EF4-FFF2-40B4-BE49-F238E27FC236}">
-                <a16:creationId xmlns:a16="http://schemas.microsoft.com/office/drawing/2014/main" id="{4CD54640-9A5F-7C45-84CA-71EF32C71174}"/>
+                <a16:creationId xmlns:a16="http://schemas.microsoft.com/office/drawing/2014/main" id="{329B1775-59BB-D728-2E3D-974E7AB44CE9}"/>
               </a:ext>
             </a:extLst>
           </p:cNvPr>
@@ -3813,7 +5096,7 @@
           <a:p>
             <a:r>
               <a:rPr lang="en-US" dirty="0"/>
-              <a:t>Factor Numbers</a:t>
+              <a:t>Factoring</a:t>
             </a:r>
           </a:p>
         </p:txBody>
@@ -3823,7 +5106,7 @@
           <p:cNvPr id="3" name="Content Placeholder 2">
             <a:extLst>
               <a:ext uri="{FF2B5EF4-FFF2-40B4-BE49-F238E27FC236}">
-                <a16:creationId xmlns:a16="http://schemas.microsoft.com/office/drawing/2014/main" id="{59EC99EA-397C-1259-8E89-A68CD25A8785}"/>
+                <a16:creationId xmlns:a16="http://schemas.microsoft.com/office/drawing/2014/main" id="{68BA2231-1A96-859C-8EDA-8F269522B2D7}"/>
               </a:ext>
             </a:extLst>
           </p:cNvPr>
@@ -3840,48 +5123,22 @@
           <a:lstStyle/>
           <a:p>
             <a:r>
-              <a:rPr lang="en-US" dirty="0"/>
-              <a:t>12+20</a:t>
-            </a:r>
-          </a:p>
-          <a:p>
-            <a:r>
               <a:rPr lang="en-US" dirty="0">
-                <a:solidFill>
-                  <a:srgbClr val="FF0000"/>
-                </a:solidFill>
-              </a:rPr>
-              <a:t>4</a:t>
-            </a:r>
-            <a:r>
-              <a:rPr lang="en-US" dirty="0"/>
-              <a:t>*3 + </a:t>
+                <a:latin typeface="Ink Free" panose="03080402000500000000" pitchFamily="66" charset="0"/>
+              </a:rPr>
+              <a:t>2x</a:t>
+            </a:r>
+            <a:r>
+              <a:rPr lang="en-US" baseline="30000" dirty="0">
+                <a:latin typeface="Ink Free" panose="03080402000500000000" pitchFamily="66" charset="0"/>
+              </a:rPr>
+              <a:t>2</a:t>
             </a:r>
             <a:r>
               <a:rPr lang="en-US" dirty="0">
-                <a:solidFill>
-                  <a:srgbClr val="FF0000"/>
-                </a:solidFill>
-              </a:rPr>
-              <a:t>4</a:t>
-            </a:r>
-            <a:r>
-              <a:rPr lang="en-US" dirty="0"/>
-              <a:t>*5</a:t>
-            </a:r>
-          </a:p>
-          <a:p>
-            <a:r>
-              <a:rPr lang="en-US" dirty="0">
-                <a:solidFill>
-                  <a:srgbClr val="FF0000"/>
-                </a:solidFill>
-              </a:rPr>
-              <a:t>4</a:t>
-            </a:r>
-            <a:r>
-              <a:rPr lang="en-US" dirty="0"/>
-              <a:t>(3+5)</a:t>
+                <a:latin typeface="Ink Free" panose="03080402000500000000" pitchFamily="66" charset="0"/>
+              </a:rPr>
+              <a:t>+12x</a:t>
             </a:r>
           </a:p>
         </p:txBody>
@@ -3889,7 +5146,7 @@
     </p:spTree>
     <p:extLst>
       <p:ext uri="{BB962C8B-B14F-4D97-AF65-F5344CB8AC3E}">
-        <p14:creationId xmlns:p14="http://schemas.microsoft.com/office/powerpoint/2010/main" val="1476113572"/>
+        <p14:creationId xmlns:p14="http://schemas.microsoft.com/office/powerpoint/2010/main" val="3617588426"/>
       </p:ext>
     </p:extLst>
   </p:cSld>
@@ -3939,7 +5196,7 @@
           <a:p>
             <a:r>
               <a:rPr lang="en-US" dirty="0"/>
-              <a:t>Factoring with variables</a:t>
+              <a:t>Factoring</a:t>
             </a:r>
           </a:p>
         </p:txBody>
@@ -3966,16 +5223,66 @@
           <a:lstStyle/>
           <a:p>
             <a:r>
-              <a:rPr lang="en-US" dirty="0"/>
+              <a:rPr lang="en-US" dirty="0">
+                <a:latin typeface="Ink Free" panose="03080402000500000000" pitchFamily="66" charset="0"/>
+              </a:rPr>
               <a:t>2x</a:t>
             </a:r>
             <a:r>
-              <a:rPr lang="en-US" baseline="30000" dirty="0"/>
+              <a:rPr lang="en-US" baseline="30000" dirty="0">
+                <a:latin typeface="Ink Free" panose="03080402000500000000" pitchFamily="66" charset="0"/>
+              </a:rPr>
               <a:t>2</a:t>
             </a:r>
             <a:r>
-              <a:rPr lang="en-US" dirty="0"/>
+              <a:rPr lang="en-US" dirty="0">
+                <a:latin typeface="Ink Free" panose="03080402000500000000" pitchFamily="66" charset="0"/>
+              </a:rPr>
               <a:t>+12x</a:t>
+            </a:r>
+          </a:p>
+          <a:p>
+            <a:r>
+              <a:rPr lang="en-US" dirty="0">
+                <a:solidFill>
+                  <a:srgbClr val="FF0000"/>
+                </a:solidFill>
+                <a:latin typeface="Ink Free" panose="03080402000500000000" pitchFamily="66" charset="0"/>
+              </a:rPr>
+              <a:t>2</a:t>
+            </a:r>
+            <a:r>
+              <a:rPr lang="en-US" dirty="0">
+                <a:latin typeface="Ink Free" panose="03080402000500000000" pitchFamily="66" charset="0"/>
+              </a:rPr>
+              <a:t>*x</a:t>
+            </a:r>
+            <a:r>
+              <a:rPr lang="en-US" baseline="30000" dirty="0">
+                <a:latin typeface="Ink Free" panose="03080402000500000000" pitchFamily="66" charset="0"/>
+              </a:rPr>
+              <a:t>2</a:t>
+            </a:r>
+            <a:r>
+              <a:rPr lang="en-US" dirty="0">
+                <a:latin typeface="Ink Free" panose="03080402000500000000" pitchFamily="66" charset="0"/>
+              </a:rPr>
+              <a:t>+ </a:t>
+            </a:r>
+            <a:r>
+              <a:rPr lang="en-US" dirty="0">
+                <a:solidFill>
+                  <a:srgbClr val="FF0000"/>
+                </a:solidFill>
+                <a:latin typeface="Ink Free" panose="03080402000500000000" pitchFamily="66" charset="0"/>
+              </a:rPr>
+              <a:t>2</a:t>
+            </a:r>
+            <a:r>
+              <a:rPr lang="en-US" dirty="0">
+                <a:latin typeface="Ink Free" panose="03080402000500000000" pitchFamily="66" charset="0"/>
+              </a:rPr>
+              <a:t>*6x</a:t>
             </a:r>
           </a:p>
         </p:txBody>
@@ -3983,7 +5290,7 @@
     </p:spTree>
     <p:extLst>
       <p:ext uri="{BB962C8B-B14F-4D97-AF65-F5344CB8AC3E}">
-        <p14:creationId xmlns:p14="http://schemas.microsoft.com/office/powerpoint/2010/main" val="3617588426"/>
+        <p14:creationId xmlns:p14="http://schemas.microsoft.com/office/powerpoint/2010/main" val="3622886205"/>
       </p:ext>
     </p:extLst>
   </p:cSld>
@@ -4033,7 +5340,7 @@
           <a:p>
             <a:r>
               <a:rPr lang="en-US" dirty="0"/>
-              <a:t>Factoring with variables</a:t>
+              <a:t>Factoring</a:t>
             </a:r>
           </a:p>
         </p:txBody>
@@ -4060,15 +5367,24 @@
           <a:lstStyle/>
           <a:p>
             <a:r>
-              <a:rPr lang="en-US" dirty="0"/>
+              <a:rPr lang="en-US" dirty="0">
+                <a:latin typeface="Ink Free" panose="020F0502020204030204" pitchFamily="34" charset="0"/>
+                <a:cs typeface="Ink Free" panose="020F0502020204030204" pitchFamily="34" charset="0"/>
+              </a:rPr>
               <a:t>2x</a:t>
             </a:r>
             <a:r>
-              <a:rPr lang="en-US" baseline="30000" dirty="0"/>
+              <a:rPr lang="en-US" baseline="30000" dirty="0">
+                <a:latin typeface="Ink Free" panose="020F0502020204030204" pitchFamily="34" charset="0"/>
+                <a:cs typeface="Ink Free" panose="020F0502020204030204" pitchFamily="34" charset="0"/>
+              </a:rPr>
               <a:t>2</a:t>
             </a:r>
             <a:r>
-              <a:rPr lang="en-US" dirty="0"/>
+              <a:rPr lang="en-US" dirty="0">
+                <a:latin typeface="Ink Free" panose="020F0502020204030204" pitchFamily="34" charset="0"/>
+                <a:cs typeface="Ink Free" panose="020F0502020204030204" pitchFamily="34" charset="0"/>
+              </a:rPr>
               <a:t>+12x</a:t>
             </a:r>
           </a:p>
@@ -4078,19 +5394,30 @@
                 <a:solidFill>
                   <a:srgbClr val="FF0000"/>
                 </a:solidFill>
+                <a:latin typeface="Ink Free" panose="020F0502020204030204" pitchFamily="34" charset="0"/>
+                <a:cs typeface="Ink Free" panose="020F0502020204030204" pitchFamily="34" charset="0"/>
               </a:rPr>
               <a:t>2</a:t>
             </a:r>
             <a:r>
-              <a:rPr lang="en-US" dirty="0"/>
+              <a:rPr lang="en-US" dirty="0">
+                <a:latin typeface="Ink Free" panose="020F0502020204030204" pitchFamily="34" charset="0"/>
+                <a:cs typeface="Ink Free" panose="020F0502020204030204" pitchFamily="34" charset="0"/>
+              </a:rPr>
               <a:t>*x</a:t>
             </a:r>
             <a:r>
-              <a:rPr lang="en-US" baseline="30000" dirty="0"/>
+              <a:rPr lang="en-US" baseline="30000" dirty="0">
+                <a:latin typeface="Ink Free" panose="020F0502020204030204" pitchFamily="34" charset="0"/>
+                <a:cs typeface="Ink Free" panose="020F0502020204030204" pitchFamily="34" charset="0"/>
+              </a:rPr>
               <a:t>2</a:t>
             </a:r>
             <a:r>
-              <a:rPr lang="en-US" dirty="0"/>
+              <a:rPr lang="en-US" dirty="0">
+                <a:latin typeface="Ink Free" panose="020F0502020204030204" pitchFamily="34" charset="0"/>
+                <a:cs typeface="Ink Free" panose="020F0502020204030204" pitchFamily="34" charset="0"/>
+              </a:rPr>
               <a:t>+ </a:t>
             </a:r>
             <a:r>
@@ -4098,20 +5425,96 @@
                 <a:solidFill>
                   <a:srgbClr val="FF0000"/>
                 </a:solidFill>
+                <a:latin typeface="Ink Free" panose="020F0502020204030204" pitchFamily="34" charset="0"/>
+                <a:cs typeface="Ink Free" panose="020F0502020204030204" pitchFamily="34" charset="0"/>
               </a:rPr>
               <a:t>2</a:t>
             </a:r>
             <a:r>
-              <a:rPr lang="en-US" dirty="0"/>
+              <a:rPr lang="en-US" dirty="0">
+                <a:latin typeface="Ink Free" panose="020F0502020204030204" pitchFamily="34" charset="0"/>
+                <a:cs typeface="Ink Free" panose="020F0502020204030204" pitchFamily="34" charset="0"/>
+              </a:rPr>
               <a:t>*6x</a:t>
             </a:r>
+          </a:p>
+          <a:p>
+            <a:r>
+              <a:rPr lang="en-US" dirty="0">
+                <a:solidFill>
+                  <a:srgbClr val="FF0000"/>
+                </a:solidFill>
+                <a:latin typeface="Ink Free" panose="020F0502020204030204" pitchFamily="34" charset="0"/>
+                <a:cs typeface="Ink Free" panose="020F0502020204030204" pitchFamily="34" charset="0"/>
+              </a:rPr>
+              <a:t>2x</a:t>
+            </a:r>
+            <a:r>
+              <a:rPr lang="en-US" dirty="0">
+                <a:latin typeface="Ink Free" panose="020F0502020204030204" pitchFamily="34" charset="0"/>
+                <a:cs typeface="Ink Free" panose="020F0502020204030204" pitchFamily="34" charset="0"/>
+              </a:rPr>
+              <a:t>*x + </a:t>
+            </a:r>
+            <a:r>
+              <a:rPr lang="en-US" dirty="0">
+                <a:solidFill>
+                  <a:srgbClr val="FF0000"/>
+                </a:solidFill>
+                <a:latin typeface="Ink Free" panose="020F0502020204030204" pitchFamily="34" charset="0"/>
+                <a:cs typeface="Ink Free" panose="020F0502020204030204" pitchFamily="34" charset="0"/>
+              </a:rPr>
+              <a:t>2x</a:t>
+            </a:r>
+            <a:r>
+              <a:rPr lang="en-US" dirty="0">
+                <a:latin typeface="Ink Free" panose="020F0502020204030204" pitchFamily="34" charset="0"/>
+                <a:cs typeface="Ink Free" panose="020F0502020204030204" pitchFamily="34" charset="0"/>
+              </a:rPr>
+              <a:t>*6</a:t>
+            </a:r>
+          </a:p>
+          <a:p>
+            <a:endParaRPr lang="en-US" dirty="0"/>
+          </a:p>
+        </p:txBody>
+      </p:sp>
+      <p:sp>
+        <p:nvSpPr>
+          <p:cNvPr id="4" name="TextBox 3">
+            <a:extLst>
+              <a:ext uri="{FF2B5EF4-FFF2-40B4-BE49-F238E27FC236}">
+                <a16:creationId xmlns:a16="http://schemas.microsoft.com/office/drawing/2014/main" id="{3B2545CD-BE7F-60A9-A0B2-666461149CF4}"/>
+              </a:ext>
+            </a:extLst>
+          </p:cNvPr>
+          <p:cNvSpPr txBox="1"/>
+          <p:nvPr/>
+        </p:nvSpPr>
+        <p:spPr>
+          <a:xfrm>
+            <a:off x="2364828" y="2191407"/>
+            <a:ext cx="184731" cy="369332"/>
+          </a:xfrm>
+          <a:prstGeom prst="rect">
+            <a:avLst/>
+          </a:prstGeom>
+          <a:noFill/>
+        </p:spPr>
+        <p:txBody>
+          <a:bodyPr wrap="none" rtlCol="0">
+            <a:spAutoFit/>
+          </a:bodyPr>
+          <a:lstStyle/>
+          <a:p>
+            <a:endParaRPr lang="en-US" dirty="0"/>
           </a:p>
         </p:txBody>
       </p:sp>
     </p:spTree>
     <p:extLst>
       <p:ext uri="{BB962C8B-B14F-4D97-AF65-F5344CB8AC3E}">
-        <p14:creationId xmlns:p14="http://schemas.microsoft.com/office/powerpoint/2010/main" val="3622886205"/>
+        <p14:creationId xmlns:p14="http://schemas.microsoft.com/office/powerpoint/2010/main" val="2152717556"/>
       </p:ext>
     </p:extLst>
   </p:cSld>
@@ -4161,7 +5564,7 @@
           <a:p>
             <a:r>
               <a:rPr lang="en-US" dirty="0"/>
-              <a:t>Factoring with variables</a:t>
+              <a:t>Factoring</a:t>
             </a:r>
           </a:p>
         </p:txBody>
@@ -4188,15 +5591,21 @@
           <a:lstStyle/>
           <a:p>
             <a:r>
-              <a:rPr lang="en-US" dirty="0"/>
+              <a:rPr lang="en-US" dirty="0">
+                <a:latin typeface="Ink Free" panose="03080402000500000000" pitchFamily="66" charset="0"/>
+              </a:rPr>
               <a:t>2x</a:t>
             </a:r>
             <a:r>
-              <a:rPr lang="en-US" baseline="30000" dirty="0"/>
+              <a:rPr lang="en-US" baseline="30000" dirty="0">
+                <a:latin typeface="Ink Free" panose="03080402000500000000" pitchFamily="66" charset="0"/>
+              </a:rPr>
               <a:t>2</a:t>
             </a:r>
             <a:r>
-              <a:rPr lang="en-US" dirty="0"/>
+              <a:rPr lang="en-US" dirty="0">
+                <a:latin typeface="Ink Free" panose="03080402000500000000" pitchFamily="66" charset="0"/>
+              </a:rPr>
               <a:t>+12x</a:t>
             </a:r>
           </a:p>
@@ -4206,19 +5615,26 @@
                 <a:solidFill>
                   <a:srgbClr val="FF0000"/>
                 </a:solidFill>
+                <a:latin typeface="Ink Free" panose="03080402000500000000" pitchFamily="66" charset="0"/>
               </a:rPr>
               <a:t>2</a:t>
             </a:r>
             <a:r>
-              <a:rPr lang="en-US" dirty="0"/>
+              <a:rPr lang="en-US" dirty="0">
+                <a:latin typeface="Ink Free" panose="03080402000500000000" pitchFamily="66" charset="0"/>
+              </a:rPr>
               <a:t>*x</a:t>
             </a:r>
             <a:r>
-              <a:rPr lang="en-US" baseline="30000" dirty="0"/>
+              <a:rPr lang="en-US" baseline="30000" dirty="0">
+                <a:latin typeface="Ink Free" panose="03080402000500000000" pitchFamily="66" charset="0"/>
+              </a:rPr>
               <a:t>2</a:t>
             </a:r>
             <a:r>
-              <a:rPr lang="en-US" dirty="0"/>
+              <a:rPr lang="en-US" dirty="0">
+                <a:latin typeface="Ink Free" panose="03080402000500000000" pitchFamily="66" charset="0"/>
+              </a:rPr>
               <a:t>+ </a:t>
             </a:r>
             <a:r>
@@ -4226,11 +5642,14 @@
                 <a:solidFill>
                   <a:srgbClr val="FF0000"/>
                 </a:solidFill>
+                <a:latin typeface="Ink Free" panose="03080402000500000000" pitchFamily="66" charset="0"/>
               </a:rPr>
               <a:t>2</a:t>
             </a:r>
             <a:r>
-              <a:rPr lang="en-US" dirty="0"/>
+              <a:rPr lang="en-US" dirty="0">
+                <a:latin typeface="Ink Free" panose="03080402000500000000" pitchFamily="66" charset="0"/>
+              </a:rPr>
               <a:t>*6x</a:t>
             </a:r>
           </a:p>
@@ -4240,11 +5659,14 @@
                 <a:solidFill>
                   <a:srgbClr val="FF0000"/>
                 </a:solidFill>
+                <a:latin typeface="Ink Free" panose="03080402000500000000" pitchFamily="66" charset="0"/>
               </a:rPr>
               <a:t>2x</a:t>
             </a:r>
             <a:r>
-              <a:rPr lang="en-US" dirty="0"/>
+              <a:rPr lang="en-US" dirty="0">
+                <a:latin typeface="Ink Free" panose="03080402000500000000" pitchFamily="66" charset="0"/>
+              </a:rPr>
               <a:t>*x + </a:t>
             </a:r>
             <a:r>
@@ -4252,12 +5674,32 @@
                 <a:solidFill>
                   <a:srgbClr val="FF0000"/>
                 </a:solidFill>
+                <a:latin typeface="Ink Free" panose="03080402000500000000" pitchFamily="66" charset="0"/>
               </a:rPr>
               <a:t>2x</a:t>
             </a:r>
             <a:r>
-              <a:rPr lang="en-US" dirty="0"/>
+              <a:rPr lang="en-US" dirty="0">
+                <a:latin typeface="Ink Free" panose="03080402000500000000" pitchFamily="66" charset="0"/>
+              </a:rPr>
               <a:t>*6</a:t>
+            </a:r>
+          </a:p>
+          <a:p>
+            <a:r>
+              <a:rPr lang="en-US" dirty="0">
+                <a:solidFill>
+                  <a:srgbClr val="FF0000"/>
+                </a:solidFill>
+                <a:latin typeface="Ink Free" panose="03080402000500000000" pitchFamily="66" charset="0"/>
+              </a:rPr>
+              <a:t>2x</a:t>
+            </a:r>
+            <a:r>
+              <a:rPr lang="en-US" dirty="0">
+                <a:latin typeface="Ink Free" panose="03080402000500000000" pitchFamily="66" charset="0"/>
+              </a:rPr>
+              <a:t>(x+6)</a:t>
             </a:r>
           </a:p>
           <a:p>
@@ -4300,7 +5742,7 @@
     </p:spTree>
     <p:extLst>
       <p:ext uri="{BB962C8B-B14F-4D97-AF65-F5344CB8AC3E}">
-        <p14:creationId xmlns:p14="http://schemas.microsoft.com/office/powerpoint/2010/main" val="2152717556"/>
+        <p14:creationId xmlns:p14="http://schemas.microsoft.com/office/powerpoint/2010/main" val="3811821813"/>
       </p:ext>
     </p:extLst>
   </p:cSld>
@@ -4350,7 +5792,7 @@
           <a:p>
             <a:r>
               <a:rPr lang="en-US" dirty="0"/>
-              <a:t>Factoring with variables</a:t>
+              <a:t>Solving Binomials</a:t>
             </a:r>
           </a:p>
         </p:txBody>
@@ -4377,133 +5819,30 @@
           <a:lstStyle/>
           <a:p>
             <a:r>
-              <a:rPr lang="en-US" dirty="0"/>
+              <a:rPr lang="en-US" dirty="0">
+                <a:latin typeface="Ink Free" panose="03080402000500000000" pitchFamily="66" charset="0"/>
+              </a:rPr>
               <a:t>2x</a:t>
             </a:r>
             <a:r>
-              <a:rPr lang="en-US" baseline="30000" dirty="0"/>
+              <a:rPr lang="en-US" baseline="30000" dirty="0">
+                <a:latin typeface="Ink Free" panose="03080402000500000000" pitchFamily="66" charset="0"/>
+              </a:rPr>
               <a:t>2</a:t>
             </a:r>
             <a:r>
-              <a:rPr lang="en-US" dirty="0"/>
-              <a:t>+12x</a:t>
-            </a:r>
-          </a:p>
-          <a:p>
-            <a:r>
               <a:rPr lang="en-US" dirty="0">
-                <a:solidFill>
-                  <a:srgbClr val="FF0000"/>
-                </a:solidFill>
-              </a:rPr>
-              <a:t>2</a:t>
-            </a:r>
-            <a:r>
-              <a:rPr lang="en-US" dirty="0"/>
-              <a:t>*x</a:t>
-            </a:r>
-            <a:r>
-              <a:rPr lang="en-US" baseline="30000" dirty="0"/>
-              <a:t>2</a:t>
-            </a:r>
-            <a:r>
-              <a:rPr lang="en-US" dirty="0"/>
-              <a:t>+ </a:t>
-            </a:r>
-            <a:r>
-              <a:rPr lang="en-US" dirty="0">
-                <a:solidFill>
-                  <a:srgbClr val="FF0000"/>
-                </a:solidFill>
-              </a:rPr>
-              <a:t>2</a:t>
-            </a:r>
-            <a:r>
-              <a:rPr lang="en-US" dirty="0"/>
-              <a:t>*6x</a:t>
-            </a:r>
-          </a:p>
-          <a:p>
-            <a:r>
-              <a:rPr lang="en-US" dirty="0">
-                <a:solidFill>
-                  <a:srgbClr val="FF0000"/>
-                </a:solidFill>
-              </a:rPr>
-              <a:t>2x</a:t>
-            </a:r>
-            <a:r>
-              <a:rPr lang="en-US" dirty="0"/>
-              <a:t>*x + </a:t>
-            </a:r>
-            <a:r>
-              <a:rPr lang="en-US" dirty="0">
-                <a:solidFill>
-                  <a:srgbClr val="FF0000"/>
-                </a:solidFill>
-              </a:rPr>
-              <a:t>2x</a:t>
-            </a:r>
-            <a:r>
-              <a:rPr lang="en-US" dirty="0"/>
-              <a:t>*6</a:t>
-            </a:r>
-          </a:p>
-          <a:p>
-            <a:r>
-              <a:rPr lang="en-US" dirty="0">
-                <a:solidFill>
-                  <a:srgbClr val="FF0000"/>
-                </a:solidFill>
-              </a:rPr>
-              <a:t>2x</a:t>
-            </a:r>
-            <a:r>
-              <a:rPr lang="en-US" dirty="0"/>
-              <a:t>(x+6)</a:t>
-            </a:r>
-          </a:p>
-          <a:p>
-            <a:endParaRPr lang="en-US" dirty="0"/>
-          </a:p>
-        </p:txBody>
-      </p:sp>
-      <p:sp>
-        <p:nvSpPr>
-          <p:cNvPr id="4" name="TextBox 3">
-            <a:extLst>
-              <a:ext uri="{FF2B5EF4-FFF2-40B4-BE49-F238E27FC236}">
-                <a16:creationId xmlns:a16="http://schemas.microsoft.com/office/drawing/2014/main" id="{3B2545CD-BE7F-60A9-A0B2-666461149CF4}"/>
-              </a:ext>
-            </a:extLst>
-          </p:cNvPr>
-          <p:cNvSpPr txBox="1"/>
-          <p:nvPr/>
-        </p:nvSpPr>
-        <p:spPr>
-          <a:xfrm>
-            <a:off x="2364828" y="2191407"/>
-            <a:ext cx="184731" cy="369332"/>
-          </a:xfrm>
-          <a:prstGeom prst="rect">
-            <a:avLst/>
-          </a:prstGeom>
-          <a:noFill/>
-        </p:spPr>
-        <p:txBody>
-          <a:bodyPr wrap="none" rtlCol="0">
-            <a:spAutoFit/>
-          </a:bodyPr>
-          <a:lstStyle/>
-          <a:p>
-            <a:endParaRPr lang="en-US" dirty="0"/>
+                <a:latin typeface="Ink Free" panose="03080402000500000000" pitchFamily="66" charset="0"/>
+              </a:rPr>
+              <a:t>+12x		= 0</a:t>
+            </a:r>
           </a:p>
         </p:txBody>
       </p:sp>
     </p:spTree>
     <p:extLst>
       <p:ext uri="{BB962C8B-B14F-4D97-AF65-F5344CB8AC3E}">
-        <p14:creationId xmlns:p14="http://schemas.microsoft.com/office/powerpoint/2010/main" val="3811821813"/>
+        <p14:creationId xmlns:p14="http://schemas.microsoft.com/office/powerpoint/2010/main" val="3607518814"/>
       </p:ext>
     </p:extLst>
   </p:cSld>

</xml_diff>